<commit_message>
2 simulations with RK3.
Results synthsized within the ppt file. But no convergence of the result observed.The RK method costs too much time to pursue thinner grid simulations. To be continued...
</commit_message>
<xml_diff>
--- a/Résultats projet n°1.pptx
+++ b/Résultats projet n°1.pptx
@@ -7,6 +7,7 @@
   <p:sldIdLst>
     <p:sldId id="256" r:id="rId2"/>
     <p:sldId id="257" r:id="rId3"/>
+    <p:sldId id="258" r:id="rId4"/>
   </p:sldIdLst>
   <p:sldSz cx="12192000" cy="6858000"/>
   <p:notesSz cx="6858000" cy="9144000"/>
@@ -105,6 +106,11 @@
       </a:defRPr>
     </a:lvl9pPr>
   </p:defaultTextStyle>
+  <p:extLst>
+    <p:ext uri="{EFAFB233-063F-42B5-8137-9DF3F51BA10A}">
+      <p15:sldGuideLst xmlns:p15="http://schemas.microsoft.com/office/powerpoint/2012/main"/>
+    </p:ext>
+  </p:extLst>
 </p:presentation>
 </file>
 
@@ -257,7 +263,7 @@
           <a:p>
             <a:fld id="{8F320AE4-98F4-4FFF-9AD3-9AD80F39EFEE}" type="datetimeFigureOut">
               <a:rPr lang="en-DE" smtClean="0"/>
-              <a:t>19/09/2023</a:t>
+              <a:t>20/09/2023</a:t>
             </a:fld>
             <a:endParaRPr lang="en-DE"/>
           </a:p>
@@ -457,7 +463,7 @@
           <a:p>
             <a:fld id="{8F320AE4-98F4-4FFF-9AD3-9AD80F39EFEE}" type="datetimeFigureOut">
               <a:rPr lang="en-DE" smtClean="0"/>
-              <a:t>19/09/2023</a:t>
+              <a:t>20/09/2023</a:t>
             </a:fld>
             <a:endParaRPr lang="en-DE"/>
           </a:p>
@@ -667,7 +673,7 @@
           <a:p>
             <a:fld id="{8F320AE4-98F4-4FFF-9AD3-9AD80F39EFEE}" type="datetimeFigureOut">
               <a:rPr lang="en-DE" smtClean="0"/>
-              <a:t>19/09/2023</a:t>
+              <a:t>20/09/2023</a:t>
             </a:fld>
             <a:endParaRPr lang="en-DE"/>
           </a:p>
@@ -867,7 +873,7 @@
           <a:p>
             <a:fld id="{8F320AE4-98F4-4FFF-9AD3-9AD80F39EFEE}" type="datetimeFigureOut">
               <a:rPr lang="en-DE" smtClean="0"/>
-              <a:t>19/09/2023</a:t>
+              <a:t>20/09/2023</a:t>
             </a:fld>
             <a:endParaRPr lang="en-DE"/>
           </a:p>
@@ -1143,7 +1149,7 @@
           <a:p>
             <a:fld id="{8F320AE4-98F4-4FFF-9AD3-9AD80F39EFEE}" type="datetimeFigureOut">
               <a:rPr lang="en-DE" smtClean="0"/>
-              <a:t>19/09/2023</a:t>
+              <a:t>20/09/2023</a:t>
             </a:fld>
             <a:endParaRPr lang="en-DE"/>
           </a:p>
@@ -1411,7 +1417,7 @@
           <a:p>
             <a:fld id="{8F320AE4-98F4-4FFF-9AD3-9AD80F39EFEE}" type="datetimeFigureOut">
               <a:rPr lang="en-DE" smtClean="0"/>
-              <a:t>19/09/2023</a:t>
+              <a:t>20/09/2023</a:t>
             </a:fld>
             <a:endParaRPr lang="en-DE"/>
           </a:p>
@@ -1826,7 +1832,7 @@
           <a:p>
             <a:fld id="{8F320AE4-98F4-4FFF-9AD3-9AD80F39EFEE}" type="datetimeFigureOut">
               <a:rPr lang="en-DE" smtClean="0"/>
-              <a:t>19/09/2023</a:t>
+              <a:t>20/09/2023</a:t>
             </a:fld>
             <a:endParaRPr lang="en-DE"/>
           </a:p>
@@ -1968,7 +1974,7 @@
           <a:p>
             <a:fld id="{8F320AE4-98F4-4FFF-9AD3-9AD80F39EFEE}" type="datetimeFigureOut">
               <a:rPr lang="en-DE" smtClean="0"/>
-              <a:t>19/09/2023</a:t>
+              <a:t>20/09/2023</a:t>
             </a:fld>
             <a:endParaRPr lang="en-DE"/>
           </a:p>
@@ -2081,7 +2087,7 @@
           <a:p>
             <a:fld id="{8F320AE4-98F4-4FFF-9AD3-9AD80F39EFEE}" type="datetimeFigureOut">
               <a:rPr lang="en-DE" smtClean="0"/>
-              <a:t>19/09/2023</a:t>
+              <a:t>20/09/2023</a:t>
             </a:fld>
             <a:endParaRPr lang="en-DE"/>
           </a:p>
@@ -2394,7 +2400,7 @@
           <a:p>
             <a:fld id="{8F320AE4-98F4-4FFF-9AD3-9AD80F39EFEE}" type="datetimeFigureOut">
               <a:rPr lang="en-DE" smtClean="0"/>
-              <a:t>19/09/2023</a:t>
+              <a:t>20/09/2023</a:t>
             </a:fld>
             <a:endParaRPr lang="en-DE"/>
           </a:p>
@@ -2683,7 +2689,7 @@
           <a:p>
             <a:fld id="{8F320AE4-98F4-4FFF-9AD3-9AD80F39EFEE}" type="datetimeFigureOut">
               <a:rPr lang="en-DE" smtClean="0"/>
-              <a:t>19/09/2023</a:t>
+              <a:t>20/09/2023</a:t>
             </a:fld>
             <a:endParaRPr lang="en-DE"/>
           </a:p>
@@ -2926,7 +2932,7 @@
           <a:p>
             <a:fld id="{8F320AE4-98F4-4FFF-9AD3-9AD80F39EFEE}" type="datetimeFigureOut">
               <a:rPr lang="en-DE" smtClean="0"/>
-              <a:t>19/09/2023</a:t>
+              <a:t>20/09/2023</a:t>
             </a:fld>
             <a:endParaRPr lang="en-DE"/>
           </a:p>
@@ -3359,7 +3365,12 @@
             <p:ph type="ctrTitle"/>
           </p:nvPr>
         </p:nvSpPr>
-        <p:spPr/>
+        <p:spPr>
+          <a:xfrm>
+            <a:off x="1524000" y="487881"/>
+            <a:ext cx="9144000" cy="1303597"/>
+          </a:xfrm>
+        </p:spPr>
         <p:txBody>
           <a:bodyPr/>
           <a:lstStyle/>
@@ -3402,7 +3413,7 @@
         </p:nvSpPr>
         <p:spPr>
           <a:xfrm>
-            <a:off x="3116424" y="3602038"/>
+            <a:off x="3116424" y="2034495"/>
             <a:ext cx="7551576" cy="1655762"/>
           </a:xfrm>
         </p:spPr>
@@ -3431,6 +3442,114 @@
           </a:p>
         </p:txBody>
       </p:sp>
+      <p:pic>
+        <p:nvPicPr>
+          <p:cNvPr id="5" name="Picture 4" descr="A yellow circle on a purple square&#10;&#10;Description automatically generated">
+            <a:extLst>
+              <a:ext uri="{FF2B5EF4-FFF2-40B4-BE49-F238E27FC236}">
+                <a16:creationId xmlns:a16="http://schemas.microsoft.com/office/drawing/2014/main" id="{59F0D97F-DA36-1E27-0D04-4BC6D9EDDDF1}"/>
+              </a:ext>
+            </a:extLst>
+          </p:cNvPr>
+          <p:cNvPicPr>
+            <a:picLocks noChangeAspect="1"/>
+          </p:cNvPicPr>
+          <p:nvPr/>
+        </p:nvPicPr>
+        <p:blipFill>
+          <a:blip r:embed="rId2">
+            <a:extLst>
+              <a:ext uri="{28A0092B-C50C-407E-A947-70E740481C1C}">
+                <a14:useLocalDpi xmlns:a14="http://schemas.microsoft.com/office/drawing/2010/main" val="0"/>
+              </a:ext>
+            </a:extLst>
+          </a:blip>
+          <a:stretch>
+            <a:fillRect/>
+          </a:stretch>
+        </p:blipFill>
+        <p:spPr>
+          <a:xfrm>
+            <a:off x="792425" y="3098064"/>
+            <a:ext cx="2995804" cy="3272056"/>
+          </a:xfrm>
+          <a:prstGeom prst="rect">
+            <a:avLst/>
+          </a:prstGeom>
+        </p:spPr>
+      </p:pic>
+      <p:pic>
+        <p:nvPicPr>
+          <p:cNvPr id="7" name="Picture 6" descr="A yellow and blue square with black text&#10;&#10;Description automatically generated">
+            <a:extLst>
+              <a:ext uri="{FF2B5EF4-FFF2-40B4-BE49-F238E27FC236}">
+                <a16:creationId xmlns:a16="http://schemas.microsoft.com/office/drawing/2014/main" id="{68E8FC87-A2A8-4B14-FF86-73645A9CB91E}"/>
+              </a:ext>
+            </a:extLst>
+          </p:cNvPr>
+          <p:cNvPicPr>
+            <a:picLocks noChangeAspect="1"/>
+          </p:cNvPicPr>
+          <p:nvPr/>
+        </p:nvPicPr>
+        <p:blipFill>
+          <a:blip r:embed="rId3">
+            <a:extLst>
+              <a:ext uri="{28A0092B-C50C-407E-A947-70E740481C1C}">
+                <a14:useLocalDpi xmlns:a14="http://schemas.microsoft.com/office/drawing/2010/main" val="0"/>
+              </a:ext>
+            </a:extLst>
+          </a:blip>
+          <a:stretch>
+            <a:fillRect/>
+          </a:stretch>
+        </p:blipFill>
+        <p:spPr>
+          <a:xfrm>
+            <a:off x="4614326" y="3098064"/>
+            <a:ext cx="2995803" cy="3272055"/>
+          </a:xfrm>
+          <a:prstGeom prst="rect">
+            <a:avLst/>
+          </a:prstGeom>
+        </p:spPr>
+      </p:pic>
+      <p:pic>
+        <p:nvPicPr>
+          <p:cNvPr id="9" name="Picture 8" descr="A diagram of a number of colored squares&#10;&#10;Description automatically generated">
+            <a:extLst>
+              <a:ext uri="{FF2B5EF4-FFF2-40B4-BE49-F238E27FC236}">
+                <a16:creationId xmlns:a16="http://schemas.microsoft.com/office/drawing/2014/main" id="{9AE8A3D7-BEF4-5EB8-442D-637DDB8E3695}"/>
+              </a:ext>
+            </a:extLst>
+          </p:cNvPr>
+          <p:cNvPicPr>
+            <a:picLocks noChangeAspect="1"/>
+          </p:cNvPicPr>
+          <p:nvPr/>
+        </p:nvPicPr>
+        <p:blipFill>
+          <a:blip r:embed="rId4">
+            <a:extLst>
+              <a:ext uri="{28A0092B-C50C-407E-A947-70E740481C1C}">
+                <a14:useLocalDpi xmlns:a14="http://schemas.microsoft.com/office/drawing/2010/main" val="0"/>
+              </a:ext>
+            </a:extLst>
+          </a:blip>
+          <a:stretch>
+            <a:fillRect/>
+          </a:stretch>
+        </p:blipFill>
+        <p:spPr>
+          <a:xfrm>
+            <a:off x="8487010" y="3098064"/>
+            <a:ext cx="3007087" cy="3272055"/>
+          </a:xfrm>
+          <a:prstGeom prst="rect">
+            <a:avLst/>
+          </a:prstGeom>
+        </p:spPr>
+      </p:pic>
     </p:spTree>
     <p:extLst>
       <p:ext uri="{BB962C8B-B14F-4D97-AF65-F5344CB8AC3E}">
@@ -3513,7 +3632,7 @@
         <p:spPr/>
         <p:txBody>
           <a:bodyPr>
-            <a:normAutofit fontScale="77500" lnSpcReduction="20000"/>
+            <a:normAutofit fontScale="85000" lnSpcReduction="20000"/>
           </a:bodyPr>
           <a:lstStyle/>
           <a:p>
@@ -3605,14 +3724,7 @@
                 <a:latin typeface="Courier New" panose="02070309020205020404" pitchFamily="49" charset="0"/>
                 <a:cs typeface="Courier New" panose="02070309020205020404" pitchFamily="49" charset="0"/>
               </a:rPr>
-              <a:t>        Metric</a:t>
-            </a:r>
-            <a:r>
-              <a:rPr lang="en-US" sz="1600">
-                <a:latin typeface="Courier New" panose="02070309020205020404" pitchFamily="49" charset="0"/>
-                <a:cs typeface="Courier New" panose="02070309020205020404" pitchFamily="49" charset="0"/>
-              </a:rPr>
-              <a:t>: 0.049998</a:t>
+              <a:t>        Metric: 0.049998</a:t>
             </a:r>
           </a:p>
           <a:p>
@@ -3633,6 +3745,248 @@
               <a:rPr lang="en-US" sz="2600" dirty="0"/>
               <a:t> simulation:</a:t>
             </a:r>
+          </a:p>
+          <a:p>
+            <a:pPr marL="0" indent="0">
+              <a:buNone/>
+            </a:pPr>
+            <a:r>
+              <a:rPr lang="en-US" sz="1600" dirty="0">
+                <a:latin typeface="Courier New" panose="02070309020205020404" pitchFamily="49" charset="0"/>
+                <a:cs typeface="Courier New" panose="02070309020205020404" pitchFamily="49" charset="0"/>
+              </a:rPr>
+              <a:t>Success: The simulation stopped running because the field was homogeneous enough (metric &lt; 0.05).</a:t>
+            </a:r>
+          </a:p>
+          <a:p>
+            <a:pPr marL="0" indent="0">
+              <a:buNone/>
+            </a:pPr>
+            <a:r>
+              <a:rPr lang="en-US" sz="1600" dirty="0">
+                <a:latin typeface="Courier New" panose="02070309020205020404" pitchFamily="49" charset="0"/>
+                <a:cs typeface="Courier New" panose="02070309020205020404" pitchFamily="49" charset="0"/>
+              </a:rPr>
+              <a:t>        Parameters: (L, D, N, $\Delta t$)=(1.0, 0.001, 400, 5e-05)</a:t>
+            </a:r>
+          </a:p>
+          <a:p>
+            <a:pPr marL="0" indent="0">
+              <a:buNone/>
+            </a:pPr>
+            <a:r>
+              <a:rPr lang="en-US" sz="1600" dirty="0">
+                <a:latin typeface="Courier New" panose="02070309020205020404" pitchFamily="49" charset="0"/>
+                <a:cs typeface="Courier New" panose="02070309020205020404" pitchFamily="49" charset="0"/>
+              </a:rPr>
+              <a:t>        Simulation duration: 2:32:04.531981</a:t>
+            </a:r>
+          </a:p>
+          <a:p>
+            <a:pPr marL="0" indent="0">
+              <a:buNone/>
+            </a:pPr>
+            <a:r>
+              <a:rPr lang="en-US" sz="1600" dirty="0">
+                <a:latin typeface="Courier New" panose="02070309020205020404" pitchFamily="49" charset="0"/>
+                <a:cs typeface="Courier New" panose="02070309020205020404" pitchFamily="49" charset="0"/>
+              </a:rPr>
+              <a:t>        Virtual stop time: 11.13 s</a:t>
+            </a:r>
+          </a:p>
+          <a:p>
+            <a:pPr marL="0" indent="0">
+              <a:buNone/>
+            </a:pPr>
+            <a:r>
+              <a:rPr lang="en-US" sz="1600" dirty="0">
+                <a:latin typeface="Courier New" panose="02070309020205020404" pitchFamily="49" charset="0"/>
+                <a:cs typeface="Courier New" panose="02070309020205020404" pitchFamily="49" charset="0"/>
+              </a:rPr>
+              <a:t>        Virtual stop frame: 222589</a:t>
+            </a:r>
+          </a:p>
+          <a:p>
+            <a:pPr marL="0" indent="0">
+              <a:buNone/>
+            </a:pPr>
+            <a:r>
+              <a:rPr lang="en-US" sz="1600" dirty="0">
+                <a:latin typeface="Courier New" panose="02070309020205020404" pitchFamily="49" charset="0"/>
+                <a:cs typeface="Courier New" panose="02070309020205020404" pitchFamily="49" charset="0"/>
+              </a:rPr>
+              <a:t>        Metric: 0.050000</a:t>
+            </a:r>
+          </a:p>
+        </p:txBody>
+      </p:sp>
+    </p:spTree>
+    <p:extLst>
+      <p:ext uri="{BB962C8B-B14F-4D97-AF65-F5344CB8AC3E}">
+        <p14:creationId xmlns:p14="http://schemas.microsoft.com/office/powerpoint/2010/main" val="495044690"/>
+      </p:ext>
+    </p:extLst>
+  </p:cSld>
+  <p:clrMapOvr>
+    <a:masterClrMapping/>
+  </p:clrMapOvr>
+</p:sld>
+</file>
+
+<file path=ppt/slides/slide3.xml><?xml version="1.0" encoding="utf-8"?>
+<p:sld xmlns:a="http://schemas.openxmlformats.org/drawingml/2006/main" xmlns:r="http://schemas.openxmlformats.org/officeDocument/2006/relationships" xmlns:p="http://schemas.openxmlformats.org/presentationml/2006/main">
+  <p:cSld>
+    <p:spTree>
+      <p:nvGrpSpPr>
+        <p:cNvPr id="1" name=""/>
+        <p:cNvGrpSpPr/>
+        <p:nvPr/>
+      </p:nvGrpSpPr>
+      <p:grpSpPr>
+        <a:xfrm>
+          <a:off x="0" y="0"/>
+          <a:ext cx="0" cy="0"/>
+          <a:chOff x="0" y="0"/>
+          <a:chExt cx="0" cy="0"/>
+        </a:xfrm>
+      </p:grpSpPr>
+      <p:sp>
+        <p:nvSpPr>
+          <p:cNvPr id="2" name="Title 1">
+            <a:extLst>
+              <a:ext uri="{FF2B5EF4-FFF2-40B4-BE49-F238E27FC236}">
+                <a16:creationId xmlns:a16="http://schemas.microsoft.com/office/drawing/2014/main" id="{D1FE3417-9165-39F6-DEBE-AA887AEB6BA2}"/>
+              </a:ext>
+            </a:extLst>
+          </p:cNvPr>
+          <p:cNvSpPr>
+            <a:spLocks noGrp="1"/>
+          </p:cNvSpPr>
+          <p:nvPr>
+            <p:ph type="title"/>
+          </p:nvPr>
+        </p:nvSpPr>
+        <p:spPr/>
+        <p:txBody>
+          <a:bodyPr/>
+          <a:lstStyle/>
+          <a:p>
+            <a:r>
+              <a:rPr lang="en-US" dirty="0" err="1"/>
+              <a:t>Méthode</a:t>
+            </a:r>
+            <a:r>
+              <a:rPr lang="en-US" dirty="0"/>
+              <a:t> RK3-Heun</a:t>
+            </a:r>
+            <a:endParaRPr lang="en-DE" dirty="0"/>
+          </a:p>
+        </p:txBody>
+      </p:sp>
+      <p:sp>
+        <p:nvSpPr>
+          <p:cNvPr id="3" name="Content Placeholder 2">
+            <a:extLst>
+              <a:ext uri="{FF2B5EF4-FFF2-40B4-BE49-F238E27FC236}">
+                <a16:creationId xmlns:a16="http://schemas.microsoft.com/office/drawing/2014/main" id="{61B711EE-3E6E-B98E-1584-A74B12AAA6D5}"/>
+              </a:ext>
+            </a:extLst>
+          </p:cNvPr>
+          <p:cNvSpPr>
+            <a:spLocks noGrp="1"/>
+          </p:cNvSpPr>
+          <p:nvPr>
+            <p:ph idx="1"/>
+          </p:nvPr>
+        </p:nvSpPr>
+        <p:spPr/>
+        <p:txBody>
+          <a:bodyPr>
+            <a:normAutofit/>
+          </a:bodyPr>
+          <a:lstStyle/>
+          <a:p>
+            <a:r>
+              <a:rPr lang="en-US" dirty="0"/>
+              <a:t>3ème simulation:</a:t>
+            </a:r>
+          </a:p>
+          <a:p>
+            <a:pPr marL="0" indent="0">
+              <a:buNone/>
+            </a:pPr>
+            <a:r>
+              <a:rPr lang="en-US" sz="1600" dirty="0">
+                <a:latin typeface="Courier New" panose="02070309020205020404" pitchFamily="49" charset="0"/>
+                <a:cs typeface="Courier New" panose="02070309020205020404" pitchFamily="49" charset="0"/>
+              </a:rPr>
+              <a:t>Success: The simulation stopped running because the field was homogeneous enough (metric &lt; 0.05).</a:t>
+            </a:r>
+          </a:p>
+          <a:p>
+            <a:pPr marL="0" indent="0">
+              <a:buNone/>
+            </a:pPr>
+            <a:r>
+              <a:rPr lang="en-US" sz="1600" dirty="0">
+                <a:latin typeface="Courier New" panose="02070309020205020404" pitchFamily="49" charset="0"/>
+                <a:cs typeface="Courier New" panose="02070309020205020404" pitchFamily="49" charset="0"/>
+              </a:rPr>
+              <a:t>        Parameters: (L, D, N, $\Delta t$)=(1.0, 0.001, 250, 0.00016)</a:t>
+            </a:r>
+          </a:p>
+          <a:p>
+            <a:pPr marL="0" indent="0">
+              <a:buNone/>
+            </a:pPr>
+            <a:r>
+              <a:rPr lang="en-US" sz="1600" dirty="0">
+                <a:latin typeface="Courier New" panose="02070309020205020404" pitchFamily="49" charset="0"/>
+                <a:cs typeface="Courier New" panose="02070309020205020404" pitchFamily="49" charset="0"/>
+              </a:rPr>
+              <a:t>        Simulation duration: 0:07:37.749528</a:t>
+            </a:r>
+          </a:p>
+          <a:p>
+            <a:pPr marL="0" indent="0">
+              <a:buNone/>
+            </a:pPr>
+            <a:r>
+              <a:rPr lang="en-US" sz="1600" dirty="0">
+                <a:latin typeface="Courier New" panose="02070309020205020404" pitchFamily="49" charset="0"/>
+                <a:cs typeface="Courier New" panose="02070309020205020404" pitchFamily="49" charset="0"/>
+              </a:rPr>
+              <a:t>        Virtual stop time: 9.59 s</a:t>
+            </a:r>
+          </a:p>
+          <a:p>
+            <a:pPr marL="0" indent="0">
+              <a:buNone/>
+            </a:pPr>
+            <a:r>
+              <a:rPr lang="en-US" sz="1600" dirty="0">
+                <a:latin typeface="Courier New" panose="02070309020205020404" pitchFamily="49" charset="0"/>
+                <a:cs typeface="Courier New" panose="02070309020205020404" pitchFamily="49" charset="0"/>
+              </a:rPr>
+              <a:t>        Virtual stop frame: 59922</a:t>
+            </a:r>
+          </a:p>
+          <a:p>
+            <a:pPr marL="0" indent="0">
+              <a:buNone/>
+            </a:pPr>
+            <a:r>
+              <a:rPr lang="en-US" sz="1600" dirty="0">
+                <a:latin typeface="Courier New" panose="02070309020205020404" pitchFamily="49" charset="0"/>
+                <a:cs typeface="Courier New" panose="02070309020205020404" pitchFamily="49" charset="0"/>
+              </a:rPr>
+              <a:t>        Metric: 0.049998</a:t>
+            </a:r>
+          </a:p>
+          <a:p>
+            <a:pPr marL="0" indent="0">
+              <a:buNone/>
+            </a:pPr>
             <a:endParaRPr lang="en-US" sz="1600" dirty="0">
               <a:latin typeface="Courier New" panose="02070309020205020404" pitchFamily="49" charset="0"/>
               <a:cs typeface="Courier New" panose="02070309020205020404" pitchFamily="49" charset="0"/>
@@ -3642,74 +3996,7 @@
             <a:pPr marL="0" indent="0">
               <a:buNone/>
             </a:pPr>
-            <a:r>
-              <a:rPr lang="en-US" sz="1600" dirty="0">
-                <a:latin typeface="Courier New" panose="02070309020205020404" pitchFamily="49" charset="0"/>
-                <a:cs typeface="Courier New" panose="02070309020205020404" pitchFamily="49" charset="0"/>
-              </a:rPr>
-              <a:t>Warning: The simulation stopped running because the max duration of simulation (1:00:00) was reached.</a:t>
-            </a:r>
-          </a:p>
-          <a:p>
-            <a:pPr marL="0" indent="0">
-              <a:buNone/>
-            </a:pPr>
-            <a:r>
-              <a:rPr lang="en-US" sz="1600" dirty="0">
-                <a:latin typeface="Courier New" panose="02070309020205020404" pitchFamily="49" charset="0"/>
-                <a:cs typeface="Courier New" panose="02070309020205020404" pitchFamily="49" charset="0"/>
-              </a:rPr>
-              <a:t>        Parameters: (L, D, N, $\Delta t$, )=(1.0, 0.001, 400, 5e-05)</a:t>
-            </a:r>
-          </a:p>
-          <a:p>
-            <a:pPr marL="0" indent="0">
-              <a:buNone/>
-            </a:pPr>
-            <a:r>
-              <a:rPr lang="en-US" sz="1600" dirty="0">
-                <a:latin typeface="Courier New" panose="02070309020205020404" pitchFamily="49" charset="0"/>
-                <a:cs typeface="Courier New" panose="02070309020205020404" pitchFamily="49" charset="0"/>
-              </a:rPr>
-              <a:t>        Simulation duration: 1:00:00.004976</a:t>
-            </a:r>
-          </a:p>
-          <a:p>
-            <a:pPr marL="0" indent="0">
-              <a:buNone/>
-            </a:pPr>
-            <a:r>
-              <a:rPr lang="en-US" sz="1600" dirty="0">
-                <a:latin typeface="Courier New" panose="02070309020205020404" pitchFamily="49" charset="0"/>
-                <a:cs typeface="Courier New" panose="02070309020205020404" pitchFamily="49" charset="0"/>
-              </a:rPr>
-              <a:t>        Virtual stop time: 4.56 s</a:t>
-            </a:r>
-          </a:p>
-          <a:p>
-            <a:pPr marL="0" indent="0">
-              <a:buNone/>
-            </a:pPr>
-            <a:r>
-              <a:rPr lang="en-US" sz="1600" dirty="0">
-                <a:latin typeface="Courier New" panose="02070309020205020404" pitchFamily="49" charset="0"/>
-                <a:cs typeface="Courier New" panose="02070309020205020404" pitchFamily="49" charset="0"/>
-              </a:rPr>
-              <a:t>        Virtual stop frame: 91132</a:t>
-            </a:r>
-          </a:p>
-          <a:p>
-            <a:pPr marL="0" indent="0">
-              <a:buNone/>
-            </a:pPr>
-            <a:r>
-              <a:rPr lang="en-US" sz="1600" dirty="0">
-                <a:latin typeface="Courier New" panose="02070309020205020404" pitchFamily="49" charset="0"/>
-                <a:cs typeface="Courier New" panose="02070309020205020404" pitchFamily="49" charset="0"/>
-              </a:rPr>
-              <a:t>        Metric: 0.349512</a:t>
-            </a:r>
-            <a:endParaRPr lang="en-DE" sz="1600" dirty="0">
+            <a:endParaRPr lang="en-US" sz="1600" dirty="0">
               <a:latin typeface="Courier New" panose="02070309020205020404" pitchFamily="49" charset="0"/>
               <a:cs typeface="Courier New" panose="02070309020205020404" pitchFamily="49" charset="0"/>
             </a:endParaRPr>
@@ -3719,7 +4006,7 @@
     </p:spTree>
     <p:extLst>
       <p:ext uri="{BB962C8B-B14F-4D97-AF65-F5344CB8AC3E}">
-        <p14:creationId xmlns:p14="http://schemas.microsoft.com/office/powerpoint/2010/main" val="495044690"/>
+        <p14:creationId xmlns:p14="http://schemas.microsoft.com/office/powerpoint/2010/main" val="3255896474"/>
       </p:ext>
     </p:extLst>
   </p:cSld>

</xml_diff>